<commit_message>
Almost finished Search functionality
</commit_message>
<xml_diff>
--- a/furniture-shop/Project-Schema.pptx
+++ b/furniture-shop/Project-Schema.pptx
@@ -254,7 +254,7 @@
           <a:p>
             <a:fld id="{959535B5-2650-4721-ACAA-B2D088B14AF0}" type="datetimeFigureOut">
               <a:rPr lang="en-US" smtClean="0"/>
-              <a:t>3/25/2024</a:t>
+              <a:t>3/27/2024</a:t>
             </a:fld>
             <a:endParaRPr lang="en-US"/>
           </a:p>
@@ -424,7 +424,7 @@
           <a:p>
             <a:fld id="{959535B5-2650-4721-ACAA-B2D088B14AF0}" type="datetimeFigureOut">
               <a:rPr lang="en-US" smtClean="0"/>
-              <a:t>3/25/2024</a:t>
+              <a:t>3/27/2024</a:t>
             </a:fld>
             <a:endParaRPr lang="en-US"/>
           </a:p>
@@ -604,7 +604,7 @@
           <a:p>
             <a:fld id="{959535B5-2650-4721-ACAA-B2D088B14AF0}" type="datetimeFigureOut">
               <a:rPr lang="en-US" smtClean="0"/>
-              <a:t>3/25/2024</a:t>
+              <a:t>3/27/2024</a:t>
             </a:fld>
             <a:endParaRPr lang="en-US"/>
           </a:p>
@@ -774,7 +774,7 @@
           <a:p>
             <a:fld id="{959535B5-2650-4721-ACAA-B2D088B14AF0}" type="datetimeFigureOut">
               <a:rPr lang="en-US" smtClean="0"/>
-              <a:t>3/25/2024</a:t>
+              <a:t>3/27/2024</a:t>
             </a:fld>
             <a:endParaRPr lang="en-US"/>
           </a:p>
@@ -1020,7 +1020,7 @@
           <a:p>
             <a:fld id="{959535B5-2650-4721-ACAA-B2D088B14AF0}" type="datetimeFigureOut">
               <a:rPr lang="en-US" smtClean="0"/>
-              <a:t>3/25/2024</a:t>
+              <a:t>3/27/2024</a:t>
             </a:fld>
             <a:endParaRPr lang="en-US"/>
           </a:p>
@@ -1252,7 +1252,7 @@
           <a:p>
             <a:fld id="{959535B5-2650-4721-ACAA-B2D088B14AF0}" type="datetimeFigureOut">
               <a:rPr lang="en-US" smtClean="0"/>
-              <a:t>3/25/2024</a:t>
+              <a:t>3/27/2024</a:t>
             </a:fld>
             <a:endParaRPr lang="en-US"/>
           </a:p>
@@ -1619,7 +1619,7 @@
           <a:p>
             <a:fld id="{959535B5-2650-4721-ACAA-B2D088B14AF0}" type="datetimeFigureOut">
               <a:rPr lang="en-US" smtClean="0"/>
-              <a:t>3/25/2024</a:t>
+              <a:t>3/27/2024</a:t>
             </a:fld>
             <a:endParaRPr lang="en-US"/>
           </a:p>
@@ -1737,7 +1737,7 @@
           <a:p>
             <a:fld id="{959535B5-2650-4721-ACAA-B2D088B14AF0}" type="datetimeFigureOut">
               <a:rPr lang="en-US" smtClean="0"/>
-              <a:t>3/25/2024</a:t>
+              <a:t>3/27/2024</a:t>
             </a:fld>
             <a:endParaRPr lang="en-US"/>
           </a:p>
@@ -1832,7 +1832,7 @@
           <a:p>
             <a:fld id="{959535B5-2650-4721-ACAA-B2D088B14AF0}" type="datetimeFigureOut">
               <a:rPr lang="en-US" smtClean="0"/>
-              <a:t>3/25/2024</a:t>
+              <a:t>3/27/2024</a:t>
             </a:fld>
             <a:endParaRPr lang="en-US"/>
           </a:p>
@@ -2109,7 +2109,7 @@
           <a:p>
             <a:fld id="{959535B5-2650-4721-ACAA-B2D088B14AF0}" type="datetimeFigureOut">
               <a:rPr lang="en-US" smtClean="0"/>
-              <a:t>3/25/2024</a:t>
+              <a:t>3/27/2024</a:t>
             </a:fld>
             <a:endParaRPr lang="en-US"/>
           </a:p>
@@ -2362,7 +2362,7 @@
           <a:p>
             <a:fld id="{959535B5-2650-4721-ACAA-B2D088B14AF0}" type="datetimeFigureOut">
               <a:rPr lang="en-US" smtClean="0"/>
-              <a:t>3/25/2024</a:t>
+              <a:t>3/27/2024</a:t>
             </a:fld>
             <a:endParaRPr lang="en-US"/>
           </a:p>
@@ -2575,7 +2575,7 @@
           <a:p>
             <a:fld id="{959535B5-2650-4721-ACAA-B2D088B14AF0}" type="datetimeFigureOut">
               <a:rPr lang="en-US" smtClean="0"/>
-              <a:t>3/25/2024</a:t>
+              <a:t>3/27/2024</a:t>
             </a:fld>
             <a:endParaRPr lang="en-US"/>
           </a:p>
@@ -4758,7 +4758,7 @@
         </p:nvSpPr>
         <p:spPr>
           <a:xfrm>
-            <a:off x="6265978" y="3635589"/>
+            <a:off x="6294229" y="4749495"/>
             <a:ext cx="740999" cy="461665"/>
           </a:xfrm>
           <a:prstGeom prst="rect">
@@ -4840,7 +4840,7 @@
         </p:nvSpPr>
         <p:spPr>
           <a:xfrm>
-            <a:off x="7182588" y="3635589"/>
+            <a:off x="7210839" y="4749495"/>
             <a:ext cx="748245" cy="461665"/>
           </a:xfrm>
           <a:prstGeom prst="rect">
@@ -4922,7 +4922,7 @@
         </p:nvSpPr>
         <p:spPr>
           <a:xfrm>
-            <a:off x="8104647" y="3635589"/>
+            <a:off x="8132898" y="4749495"/>
             <a:ext cx="679941" cy="461665"/>
           </a:xfrm>
           <a:prstGeom prst="rect">
@@ -5006,9 +5006,9 @@
           <p:nvPr/>
         </p:nvCxnSpPr>
         <p:spPr>
-          <a:xfrm flipH="1">
-            <a:off x="6636478" y="3032760"/>
-            <a:ext cx="28251" cy="602829"/>
+          <a:xfrm>
+            <a:off x="6664729" y="3032760"/>
+            <a:ext cx="0" cy="1716735"/>
           </a:xfrm>
           <a:prstGeom prst="straightConnector1">
             <a:avLst/>
@@ -5044,7 +5044,7 @@
         <p:spPr>
           <a:xfrm>
             <a:off x="6664729" y="3032760"/>
-            <a:ext cx="891982" cy="602829"/>
+            <a:ext cx="920233" cy="1716735"/>
           </a:xfrm>
           <a:prstGeom prst="straightConnector1">
             <a:avLst/>
@@ -5080,7 +5080,7 @@
         <p:spPr>
           <a:xfrm>
             <a:off x="6664729" y="3032760"/>
-            <a:ext cx="1779889" cy="602829"/>
+            <a:ext cx="1808140" cy="1716735"/>
           </a:xfrm>
           <a:prstGeom prst="straightConnector1">
             <a:avLst/>
@@ -5112,8 +5112,8 @@
         </p:nvCxnSpPr>
         <p:spPr>
           <a:xfrm rot="5400000">
-            <a:off x="9827367" y="2474479"/>
-            <a:ext cx="14400" cy="1008000"/>
+            <a:off x="9857742" y="2472679"/>
+            <a:ext cx="10800" cy="1008000"/>
           </a:xfrm>
           <a:prstGeom prst="curvedConnector3">
             <a:avLst>
@@ -5147,12 +5147,50 @@
         </p:nvCxnSpPr>
         <p:spPr>
           <a:xfrm rot="16200000" flipH="1">
-            <a:off x="8687510" y="2382779"/>
-            <a:ext cx="14400" cy="1188000"/>
+            <a:off x="8660735" y="2384579"/>
+            <a:ext cx="10800" cy="1188000"/>
           </a:xfrm>
           <a:prstGeom prst="curvedConnector3">
             <a:avLst>
               <a:gd name="adj1" fmla="val 1800000"/>
+            </a:avLst>
+          </a:prstGeom>
+          <a:ln>
+            <a:tailEnd type="triangle"/>
+          </a:ln>
+        </p:spPr>
+        <p:style>
+          <a:lnRef idx="1">
+            <a:schemeClr val="accent1"/>
+          </a:lnRef>
+          <a:fillRef idx="0">
+            <a:schemeClr val="accent1"/>
+          </a:fillRef>
+          <a:effectRef idx="0">
+            <a:schemeClr val="accent1"/>
+          </a:effectRef>
+          <a:fontRef idx="minor">
+            <a:schemeClr val="tx1"/>
+          </a:fontRef>
+        </p:style>
+      </p:cxnSp>
+      <p:cxnSp>
+        <p:nvCxnSpPr>
+          <p:cNvPr id="16" name="Curved Connector 15"/>
+          <p:cNvCxnSpPr>
+            <a:stCxn id="26" idx="2"/>
+            <a:endCxn id="41" idx="2"/>
+          </p:cNvCxnSpPr>
+          <p:nvPr/>
+        </p:nvCxnSpPr>
+        <p:spPr>
+          <a:xfrm rot="16200000" flipH="1">
+            <a:off x="5373650" y="-974525"/>
+            <a:ext cx="12700" cy="7888439"/>
+          </a:xfrm>
+          <a:prstGeom prst="curvedConnector3">
+            <a:avLst>
+              <a:gd name="adj1" fmla="val 5989087"/>
             </a:avLst>
           </a:prstGeom>
           <a:ln>

</xml_diff>